<commit_message>
Added table of contents
</commit_message>
<xml_diff>
--- a/Infrastructure final presentation.pptx
+++ b/Infrastructure final presentation.pptx
@@ -7,16 +7,17 @@
   </p:sldMasterIdLst>
   <p:sldIdLst>
     <p:sldId id="269" r:id="rId3"/>
-    <p:sldId id="256" r:id="rId4"/>
-    <p:sldId id="257" r:id="rId5"/>
-    <p:sldId id="258" r:id="rId6"/>
-    <p:sldId id="259" r:id="rId7"/>
-    <p:sldId id="260" r:id="rId8"/>
-    <p:sldId id="263" r:id="rId9"/>
-    <p:sldId id="264" r:id="rId10"/>
-    <p:sldId id="265" r:id="rId11"/>
-    <p:sldId id="266" r:id="rId12"/>
-    <p:sldId id="270" r:id="rId13"/>
+    <p:sldId id="271" r:id="rId4"/>
+    <p:sldId id="256" r:id="rId5"/>
+    <p:sldId id="257" r:id="rId6"/>
+    <p:sldId id="258" r:id="rId7"/>
+    <p:sldId id="259" r:id="rId8"/>
+    <p:sldId id="260" r:id="rId9"/>
+    <p:sldId id="263" r:id="rId10"/>
+    <p:sldId id="264" r:id="rId11"/>
+    <p:sldId id="265" r:id="rId12"/>
+    <p:sldId id="266" r:id="rId13"/>
+    <p:sldId id="270" r:id="rId14"/>
   </p:sldIdLst>
   <p:sldSz cx="12192000" cy="6858000"/>
   <p:notesSz cx="6858000" cy="9144000"/>
@@ -115,6 +116,11 @@
       </a:defRPr>
     </a:lvl9pPr>
   </p:defaultTextStyle>
+  <p:extLst>
+    <p:ext uri="{EFAFB233-063F-42B5-8137-9DF3F51BA10A}">
+      <p15:sldGuideLst xmlns:p15="http://schemas.microsoft.com/office/powerpoint/2012/main"/>
+    </p:ext>
+  </p:extLst>
 </p:presentation>
 </file>
 
@@ -587,7 +593,7 @@
           <a:p>
             <a:fld id="{EA0C0817-A112-4847-8014-A94B7D2A4EA3}" type="datetime1">
               <a:rPr lang="en-US" smtClean="0"/>
-              <a:t>5/5/2020</a:t>
+              <a:t>5/6/2020</a:t>
             </a:fld>
             <a:endParaRPr lang="en-US" dirty="0"/>
           </a:p>
@@ -789,7 +795,7 @@
           <a:p>
             <a:fld id="{134F40B7-36AB-4376-BE14-EF7004D79BB9}" type="datetime1">
               <a:rPr lang="en-US" smtClean="0"/>
-              <a:t>5/5/2020</a:t>
+              <a:t>5/6/2020</a:t>
             </a:fld>
             <a:endParaRPr lang="en-US"/>
           </a:p>
@@ -969,7 +975,7 @@
           <a:p>
             <a:fld id="{FF87CAB8-DCAE-46A5-AADA-B3FAD11A54E0}" type="datetime1">
               <a:rPr lang="en-US" smtClean="0"/>
-              <a:t>5/5/2020</a:t>
+              <a:t>5/6/2020</a:t>
             </a:fld>
             <a:endParaRPr lang="en-US"/>
           </a:p>
@@ -3377,7 +3383,7 @@
           <a:p>
             <a:fld id="{3C04E684-10F4-4CC3-A0B9-F03AA7BE37CF}" type="datetimeFigureOut">
               <a:rPr lang="en-US" smtClean="0"/>
-              <a:t>5/5/2020</a:t>
+              <a:t>5/6/2020</a:t>
             </a:fld>
             <a:endParaRPr lang="en-US"/>
           </a:p>
@@ -4114,7 +4120,7 @@
           <a:p>
             <a:fld id="{3C04E684-10F4-4CC3-A0B9-F03AA7BE37CF}" type="datetimeFigureOut">
               <a:rPr lang="en-US" smtClean="0"/>
-              <a:t>5/5/2020</a:t>
+              <a:t>5/6/2020</a:t>
             </a:fld>
             <a:endParaRPr lang="en-US"/>
           </a:p>
@@ -4756,7 +4762,7 @@
           <a:p>
             <a:fld id="{3C04E684-10F4-4CC3-A0B9-F03AA7BE37CF}" type="datetimeFigureOut">
               <a:rPr lang="en-US" smtClean="0"/>
-              <a:t>5/5/2020</a:t>
+              <a:t>5/6/2020</a:t>
             </a:fld>
             <a:endParaRPr lang="en-US"/>
           </a:p>
@@ -5556,7 +5562,7 @@
           <a:p>
             <a:fld id="{3C04E684-10F4-4CC3-A0B9-F03AA7BE37CF}" type="datetimeFigureOut">
               <a:rPr lang="en-US" smtClean="0"/>
-              <a:t>5/5/2020</a:t>
+              <a:t>5/6/2020</a:t>
             </a:fld>
             <a:endParaRPr lang="en-US"/>
           </a:p>
@@ -6507,7 +6513,7 @@
           <a:p>
             <a:fld id="{3C04E684-10F4-4CC3-A0B9-F03AA7BE37CF}" type="datetimeFigureOut">
               <a:rPr lang="en-US" smtClean="0"/>
-              <a:t>5/5/2020</a:t>
+              <a:t>5/6/2020</a:t>
             </a:fld>
             <a:endParaRPr lang="en-US"/>
           </a:p>
@@ -8856,7 +8862,7 @@
           <a:p>
             <a:fld id="{3C04E684-10F4-4CC3-A0B9-F03AA7BE37CF}" type="datetimeFigureOut">
               <a:rPr lang="en-US" smtClean="0"/>
-              <a:t>5/5/2020</a:t>
+              <a:t>5/6/2020</a:t>
             </a:fld>
             <a:endParaRPr lang="en-US"/>
           </a:p>
@@ -8969,7 +8975,7 @@
           <a:p>
             <a:fld id="{3C04E684-10F4-4CC3-A0B9-F03AA7BE37CF}" type="datetimeFigureOut">
               <a:rPr lang="en-US" smtClean="0"/>
-              <a:t>5/5/2020</a:t>
+              <a:t>5/6/2020</a:t>
             </a:fld>
             <a:endParaRPr lang="en-US"/>
           </a:p>
@@ -9476,7 +9482,7 @@
           <a:p>
             <a:fld id="{3C04E684-10F4-4CC3-A0B9-F03AA7BE37CF}" type="datetimeFigureOut">
               <a:rPr lang="en-US" smtClean="0"/>
-              <a:t>5/5/2020</a:t>
+              <a:t>5/6/2020</a:t>
             </a:fld>
             <a:endParaRPr lang="en-US"/>
           </a:p>
@@ -9658,7 +9664,7 @@
           <a:p>
             <a:fld id="{7332B432-ACDA-4023-A761-2BAB76577B62}" type="datetime1">
               <a:rPr lang="en-US" smtClean="0"/>
-              <a:t>5/5/2020</a:t>
+              <a:t>5/6/2020</a:t>
             </a:fld>
             <a:endParaRPr lang="en-US"/>
           </a:p>
@@ -10949,7 +10955,7 @@
           <a:p>
             <a:fld id="{3C04E684-10F4-4CC3-A0B9-F03AA7BE37CF}" type="datetimeFigureOut">
               <a:rPr lang="en-US" smtClean="0"/>
-              <a:t>5/5/2020</a:t>
+              <a:t>5/6/2020</a:t>
             </a:fld>
             <a:endParaRPr lang="en-US"/>
           </a:p>
@@ -13443,7 +13449,7 @@
           <a:p>
             <a:fld id="{3C04E684-10F4-4CC3-A0B9-F03AA7BE37CF}" type="datetimeFigureOut">
               <a:rPr lang="en-US" smtClean="0"/>
-              <a:t>5/5/2020</a:t>
+              <a:t>5/6/2020</a:t>
             </a:fld>
             <a:endParaRPr lang="en-US"/>
           </a:p>
@@ -13641,7 +13647,7 @@
           <a:p>
             <a:fld id="{3C04E684-10F4-4CC3-A0B9-F03AA7BE37CF}" type="datetimeFigureOut">
               <a:rPr lang="en-US" smtClean="0"/>
-              <a:t>5/5/2020</a:t>
+              <a:t>5/6/2020</a:t>
             </a:fld>
             <a:endParaRPr lang="en-US"/>
           </a:p>
@@ -13849,7 +13855,7 @@
           <a:p>
             <a:fld id="{3C04E684-10F4-4CC3-A0B9-F03AA7BE37CF}" type="datetimeFigureOut">
               <a:rPr lang="en-US" smtClean="0"/>
-              <a:t>5/5/2020</a:t>
+              <a:t>5/6/2020</a:t>
             </a:fld>
             <a:endParaRPr lang="en-US"/>
           </a:p>
@@ -14460,7 +14466,7 @@
           <a:p>
             <a:fld id="{D9C646AA-F36E-4540-911D-FFFC0A0EF24A}" type="datetime1">
               <a:rPr lang="en-US" smtClean="0"/>
-              <a:t>5/5/2020</a:t>
+              <a:t>5/6/2020</a:t>
             </a:fld>
             <a:endParaRPr lang="en-US" dirty="0"/>
           </a:p>
@@ -14780,7 +14786,7 @@
           <a:p>
             <a:fld id="{69186D26-FA5F-4637-B602-B7C2DC34CFD4}" type="datetime1">
               <a:rPr lang="en-US" smtClean="0"/>
-              <a:t>5/5/2020</a:t>
+              <a:t>5/6/2020</a:t>
             </a:fld>
             <a:endParaRPr lang="en-US"/>
           </a:p>
@@ -15215,7 +15221,7 @@
           <a:p>
             <a:fld id="{8A7F15D8-96D1-4781-BC50-CA8A088B2FE4}" type="datetime1">
               <a:rPr lang="en-US" smtClean="0"/>
-              <a:t>5/5/2020</a:t>
+              <a:t>5/6/2020</a:t>
             </a:fld>
             <a:endParaRPr lang="en-US"/>
           </a:p>
@@ -15333,7 +15339,7 @@
           <a:p>
             <a:fld id="{F9A96C99-B8F8-4528-BD05-0E16E943DC09}" type="datetime1">
               <a:rPr lang="en-US" smtClean="0"/>
-              <a:t>5/5/2020</a:t>
+              <a:t>5/6/2020</a:t>
             </a:fld>
             <a:endParaRPr lang="en-US"/>
           </a:p>
@@ -15428,7 +15434,7 @@
           <a:p>
             <a:fld id="{03636942-C211-4B28-8DBD-C953E00AF71B}" type="datetime1">
               <a:rPr lang="en-US" smtClean="0"/>
-              <a:t>5/5/2020</a:t>
+              <a:t>5/6/2020</a:t>
             </a:fld>
             <a:endParaRPr lang="en-US"/>
           </a:p>
@@ -15845,7 +15851,7 @@
           <a:p>
             <a:fld id="{7E8D12A6-918A-48BD-8CB9-CA713993B0EA}" type="datetime1">
               <a:rPr lang="en-US" smtClean="0"/>
-              <a:t>5/5/2020</a:t>
+              <a:t>5/6/2020</a:t>
             </a:fld>
             <a:endParaRPr lang="en-US"/>
           </a:p>
@@ -16107,7 +16113,7 @@
             <a:fld id="{E778CE86-875F-4587-BCF6-FA054AFC0D53}" type="datetime1">
               <a:rPr lang="en-US" smtClean="0"/>
               <a:pPr/>
-              <a:t>5/5/2020</a:t>
+              <a:t>5/6/2020</a:t>
             </a:fld>
             <a:endParaRPr lang="en-US" dirty="0"/>
           </a:p>
@@ -16623,7 +16629,7 @@
           <a:p>
             <a:fld id="{F6FA2B21-3FCD-4721-B95C-427943F61125}" type="datetime1">
               <a:rPr lang="en-US" smtClean="0"/>
-              <a:t>5/5/2020</a:t>
+              <a:t>5/6/2020</a:t>
             </a:fld>
             <a:endParaRPr lang="en-US"/>
           </a:p>
@@ -17245,7 +17251,7 @@
           <a:p>
             <a:fld id="{3C04E684-10F4-4CC3-A0B9-F03AA7BE37CF}" type="datetimeFigureOut">
               <a:rPr lang="en-US" smtClean="0"/>
-              <a:t>5/5/2020</a:t>
+              <a:t>5/6/2020</a:t>
             </a:fld>
             <a:endParaRPr lang="en-US"/>
           </a:p>
@@ -18354,6 +18360,388 @@
         </p:nvSpPr>
         <p:spPr>
           <a:xfrm>
+            <a:off x="1173480" y="870132"/>
+            <a:ext cx="9794240" cy="1527078"/>
+          </a:xfrm>
+        </p:spPr>
+        <p:txBody>
+          <a:bodyPr>
+            <a:normAutofit/>
+          </a:bodyPr>
+          <a:lstStyle/>
+          <a:p>
+            <a:r>
+              <a:rPr lang="en-GB" sz="3200" dirty="0"/>
+              <a:t>Week 9 (Routing, Maintenance and drawing of infrastructure)</a:t>
+            </a:r>
+          </a:p>
+        </p:txBody>
+      </p:sp>
+      <p:sp>
+        <p:nvSpPr>
+          <p:cNvPr id="3" name="Content Placeholder 2">
+            <a:extLst>
+              <a:ext uri="{FF2B5EF4-FFF2-40B4-BE49-F238E27FC236}">
+                <a16:creationId xmlns:a16="http://schemas.microsoft.com/office/drawing/2014/main" id="{8ACBB345-4854-4927-B81F-6A4BB7B77E19}"/>
+              </a:ext>
+            </a:extLst>
+          </p:cNvPr>
+          <p:cNvSpPr>
+            <a:spLocks noGrp="1"/>
+          </p:cNvSpPr>
+          <p:nvPr>
+            <p:ph idx="1"/>
+          </p:nvPr>
+        </p:nvSpPr>
+        <p:spPr>
+          <a:xfrm>
+            <a:off x="1175512" y="2557849"/>
+            <a:ext cx="9792208" cy="3407862"/>
+          </a:xfrm>
+        </p:spPr>
+        <p:txBody>
+          <a:bodyPr>
+            <a:normAutofit/>
+          </a:bodyPr>
+          <a:lstStyle/>
+          <a:p>
+            <a:r>
+              <a:rPr lang="en-GB" dirty="0">
+                <a:latin typeface="Century Schoolbook (Headings)"/>
+              </a:rPr>
+              <a:t>Direct host route</a:t>
+            </a:r>
+          </a:p>
+          <a:p>
+            <a:r>
+              <a:rPr lang="en-GB" dirty="0">
+                <a:latin typeface="Century Schoolbook (Headings)"/>
+              </a:rPr>
+              <a:t>Default route</a:t>
+            </a:r>
+          </a:p>
+          <a:p>
+            <a:r>
+              <a:rPr lang="en-GB" dirty="0">
+                <a:latin typeface="Century Schoolbook (Headings)"/>
+              </a:rPr>
+              <a:t>Host route</a:t>
+            </a:r>
+          </a:p>
+          <a:p>
+            <a:r>
+              <a:rPr lang="en-GB" dirty="0">
+                <a:latin typeface="Century Schoolbook (Headings)"/>
+              </a:rPr>
+              <a:t>Network route</a:t>
+            </a:r>
+          </a:p>
+          <a:p>
+            <a:r>
+              <a:rPr lang="en-GB" dirty="0">
+                <a:latin typeface="Century Schoolbook (Headings)"/>
+              </a:rPr>
+              <a:t>How did we apply the above methods?</a:t>
+            </a:r>
+          </a:p>
+          <a:p>
+            <a:endParaRPr lang="en-GB" dirty="0"/>
+          </a:p>
+          <a:p>
+            <a:endParaRPr lang="en-GB" dirty="0"/>
+          </a:p>
+        </p:txBody>
+      </p:sp>
+    </p:spTree>
+    <p:extLst>
+      <p:ext uri="{BB962C8B-B14F-4D97-AF65-F5344CB8AC3E}">
+        <p14:creationId xmlns:p14="http://schemas.microsoft.com/office/powerpoint/2010/main" val="276864233"/>
+      </p:ext>
+    </p:extLst>
+  </p:cSld>
+  <p:clrMapOvr>
+    <a:overrideClrMapping bg1="dk1" tx1="lt1" bg2="dk2" tx2="lt2" accent1="accent1" accent2="accent2" accent3="accent3" accent4="accent4" accent5="accent5" accent6="accent6" hlink="hlink" folHlink="folHlink"/>
+  </p:clrMapOvr>
+</p:sld>
+</file>
+
+<file path=ppt/slides/slide11.xml><?xml version="1.0" encoding="utf-8"?>
+<p:sld xmlns:a="http://schemas.openxmlformats.org/drawingml/2006/main" xmlns:r="http://schemas.openxmlformats.org/officeDocument/2006/relationships" xmlns:p="http://schemas.openxmlformats.org/presentationml/2006/main">
+  <p:cSld>
+    <p:bg>
+      <p:bgPr>
+        <a:solidFill>
+          <a:schemeClr val="bg2"/>
+        </a:solidFill>
+        <a:effectLst/>
+      </p:bgPr>
+    </p:bg>
+    <p:spTree>
+      <p:nvGrpSpPr>
+        <p:cNvPr id="1" name=""/>
+        <p:cNvGrpSpPr/>
+        <p:nvPr/>
+      </p:nvGrpSpPr>
+      <p:grpSpPr>
+        <a:xfrm>
+          <a:off x="0" y="0"/>
+          <a:ext cx="0" cy="0"/>
+          <a:chOff x="0" y="0"/>
+          <a:chExt cx="0" cy="0"/>
+        </a:xfrm>
+      </p:grpSpPr>
+      <p:sp>
+        <p:nvSpPr>
+          <p:cNvPr id="8" name="Rectangle 7">
+            <a:extLst>
+              <a:ext uri="{FF2B5EF4-FFF2-40B4-BE49-F238E27FC236}">
+                <a16:creationId xmlns:a16="http://schemas.microsoft.com/office/drawing/2014/main" id="{70120F84-A866-4D9F-8B1C-9120A013D654}"/>
+              </a:ext>
+              <a:ext uri="{C183D7F6-B498-43B3-948B-1728B52AA6E4}">
+                <adec:decorative xmlns:adec="http://schemas.microsoft.com/office/drawing/2017/decorative" val="1"/>
+              </a:ext>
+            </a:extLst>
+          </p:cNvPr>
+          <p:cNvSpPr>
+            <a:spLocks noGrp="1" noRot="1" noChangeAspect="1" noMove="1" noResize="1" noEditPoints="1" noAdjustHandles="1" noChangeArrowheads="1" noChangeShapeType="1" noTextEdit="1"/>
+          </p:cNvSpPr>
+          <p:nvPr>
+            <p:extLst>
+              <p:ext uri="{386F3935-93C4-4BCD-93E2-E3B085C9AB24}">
+                <p16:designElem xmlns:p16="http://schemas.microsoft.com/office/powerpoint/2015/main" val="1"/>
+              </p:ext>
+            </p:extLst>
+          </p:nvPr>
+        </p:nvSpPr>
+        <p:spPr>
+          <a:xfrm>
+            <a:off x="0" y="0"/>
+            <a:ext cx="12192001" cy="6858000"/>
+          </a:xfrm>
+          <a:prstGeom prst="rect">
+            <a:avLst/>
+          </a:prstGeom>
+          <a:solidFill>
+            <a:schemeClr val="tx1">
+              <a:lumMod val="65000"/>
+              <a:lumOff val="35000"/>
+            </a:schemeClr>
+          </a:solidFill>
+          <a:ln>
+            <a:noFill/>
+          </a:ln>
+        </p:spPr>
+        <p:style>
+          <a:lnRef idx="2">
+            <a:schemeClr val="accent1">
+              <a:shade val="50000"/>
+            </a:schemeClr>
+          </a:lnRef>
+          <a:fillRef idx="1">
+            <a:schemeClr val="accent1"/>
+          </a:fillRef>
+          <a:effectRef idx="0">
+            <a:schemeClr val="accent1"/>
+          </a:effectRef>
+          <a:fontRef idx="minor">
+            <a:schemeClr val="lt1"/>
+          </a:fontRef>
+        </p:style>
+        <p:txBody>
+          <a:bodyPr rot="0" spcFirstLastPara="0" vert="horz" wrap="square" lIns="91440" tIns="45720" rIns="91440" bIns="45720" numCol="1" spcCol="0" rtlCol="0" fromWordArt="0" anchor="ctr" anchorCtr="0" forceAA="0" compatLnSpc="1">
+            <a:prstTxWarp prst="textNoShape">
+              <a:avLst/>
+            </a:prstTxWarp>
+            <a:noAutofit/>
+          </a:bodyPr>
+          <a:lstStyle>
+            <a:defPPr>
+              <a:defRPr lang="en-US"/>
+            </a:defPPr>
+            <a:lvl1pPr marL="0" algn="l" defTabSz="914400" rtl="0" eaLnBrk="1" latinLnBrk="0" hangingPunct="1">
+              <a:defRPr sz="1800" kern="1200">
+                <a:solidFill>
+                  <a:schemeClr val="lt1"/>
+                </a:solidFill>
+                <a:latin typeface="+mn-lt"/>
+                <a:ea typeface="+mn-ea"/>
+                <a:cs typeface="+mn-cs"/>
+              </a:defRPr>
+            </a:lvl1pPr>
+            <a:lvl2pPr marL="457200" algn="l" defTabSz="914400" rtl="0" eaLnBrk="1" latinLnBrk="0" hangingPunct="1">
+              <a:defRPr sz="1800" kern="1200">
+                <a:solidFill>
+                  <a:schemeClr val="lt1"/>
+                </a:solidFill>
+                <a:latin typeface="+mn-lt"/>
+                <a:ea typeface="+mn-ea"/>
+                <a:cs typeface="+mn-cs"/>
+              </a:defRPr>
+            </a:lvl2pPr>
+            <a:lvl3pPr marL="914400" algn="l" defTabSz="914400" rtl="0" eaLnBrk="1" latinLnBrk="0" hangingPunct="1">
+              <a:defRPr sz="1800" kern="1200">
+                <a:solidFill>
+                  <a:schemeClr val="lt1"/>
+                </a:solidFill>
+                <a:latin typeface="+mn-lt"/>
+                <a:ea typeface="+mn-ea"/>
+                <a:cs typeface="+mn-cs"/>
+              </a:defRPr>
+            </a:lvl3pPr>
+            <a:lvl4pPr marL="1371600" algn="l" defTabSz="914400" rtl="0" eaLnBrk="1" latinLnBrk="0" hangingPunct="1">
+              <a:defRPr sz="1800" kern="1200">
+                <a:solidFill>
+                  <a:schemeClr val="lt1"/>
+                </a:solidFill>
+                <a:latin typeface="+mn-lt"/>
+                <a:ea typeface="+mn-ea"/>
+                <a:cs typeface="+mn-cs"/>
+              </a:defRPr>
+            </a:lvl4pPr>
+            <a:lvl5pPr marL="1828800" algn="l" defTabSz="914400" rtl="0" eaLnBrk="1" latinLnBrk="0" hangingPunct="1">
+              <a:defRPr sz="1800" kern="1200">
+                <a:solidFill>
+                  <a:schemeClr val="lt1"/>
+                </a:solidFill>
+                <a:latin typeface="+mn-lt"/>
+                <a:ea typeface="+mn-ea"/>
+                <a:cs typeface="+mn-cs"/>
+              </a:defRPr>
+            </a:lvl5pPr>
+            <a:lvl6pPr marL="2286000" algn="l" defTabSz="914400" rtl="0" eaLnBrk="1" latinLnBrk="0" hangingPunct="1">
+              <a:defRPr sz="1800" kern="1200">
+                <a:solidFill>
+                  <a:schemeClr val="lt1"/>
+                </a:solidFill>
+                <a:latin typeface="+mn-lt"/>
+                <a:ea typeface="+mn-ea"/>
+                <a:cs typeface="+mn-cs"/>
+              </a:defRPr>
+            </a:lvl6pPr>
+            <a:lvl7pPr marL="2743200" algn="l" defTabSz="914400" rtl="0" eaLnBrk="1" latinLnBrk="0" hangingPunct="1">
+              <a:defRPr sz="1800" kern="1200">
+                <a:solidFill>
+                  <a:schemeClr val="lt1"/>
+                </a:solidFill>
+                <a:latin typeface="+mn-lt"/>
+                <a:ea typeface="+mn-ea"/>
+                <a:cs typeface="+mn-cs"/>
+              </a:defRPr>
+            </a:lvl7pPr>
+            <a:lvl8pPr marL="3200400" algn="l" defTabSz="914400" rtl="0" eaLnBrk="1" latinLnBrk="0" hangingPunct="1">
+              <a:defRPr sz="1800" kern="1200">
+                <a:solidFill>
+                  <a:schemeClr val="lt1"/>
+                </a:solidFill>
+                <a:latin typeface="+mn-lt"/>
+                <a:ea typeface="+mn-ea"/>
+                <a:cs typeface="+mn-cs"/>
+              </a:defRPr>
+            </a:lvl8pPr>
+            <a:lvl9pPr marL="3657600" algn="l" defTabSz="914400" rtl="0" eaLnBrk="1" latinLnBrk="0" hangingPunct="1">
+              <a:defRPr sz="1800" kern="1200">
+                <a:solidFill>
+                  <a:schemeClr val="lt1"/>
+                </a:solidFill>
+                <a:latin typeface="+mn-lt"/>
+                <a:ea typeface="+mn-ea"/>
+                <a:cs typeface="+mn-cs"/>
+              </a:defRPr>
+            </a:lvl9pPr>
+          </a:lstStyle>
+          <a:p>
+            <a:pPr marL="0" marR="0" lvl="0" indent="0" algn="ctr" defTabSz="914400" rtl="0" eaLnBrk="1" fontAlgn="auto" latinLnBrk="0" hangingPunct="1">
+              <a:lnSpc>
+                <a:spcPct val="100000"/>
+              </a:lnSpc>
+              <a:spcBef>
+                <a:spcPts val="0"/>
+              </a:spcBef>
+              <a:spcAft>
+                <a:spcPts val="0"/>
+              </a:spcAft>
+              <a:buClrTx/>
+              <a:buSzTx/>
+              <a:buFontTx/>
+              <a:buNone/>
+              <a:tabLst/>
+              <a:defRPr/>
+            </a:pPr>
+            <a:endParaRPr kumimoji="0" lang="en-US" sz="1800" b="0" i="0" u="none" strike="noStrike" kern="1200" cap="none" spc="0" normalizeH="0" baseline="0" noProof="0">
+              <a:ln>
+                <a:noFill/>
+              </a:ln>
+              <a:solidFill>
+                <a:srgbClr val="FFFFFF"/>
+              </a:solidFill>
+              <a:effectLst/>
+              <a:uLnTx/>
+              <a:uFillTx/>
+              <a:latin typeface="Franklin Gothic Book" panose="02020404030301010803"/>
+              <a:ea typeface="+mn-ea"/>
+              <a:cs typeface="+mn-cs"/>
+            </a:endParaRPr>
+          </a:p>
+        </p:txBody>
+      </p:sp>
+      <p:sp useBgFill="1">
+        <p:nvSpPr>
+          <p:cNvPr id="10" name="Rectangle 9">
+            <a:extLst>
+              <a:ext uri="{FF2B5EF4-FFF2-40B4-BE49-F238E27FC236}">
+                <a16:creationId xmlns:a16="http://schemas.microsoft.com/office/drawing/2014/main" id="{252FEFEF-6AC0-46B6-AC09-11FC56196FA4}"/>
+              </a:ext>
+              <a:ext uri="{C183D7F6-B498-43B3-948B-1728B52AA6E4}">
+                <adec:decorative xmlns:adec="http://schemas.microsoft.com/office/drawing/2017/decorative" val="1"/>
+              </a:ext>
+            </a:extLst>
+          </p:cNvPr>
+          <p:cNvSpPr>
+            <a:spLocks noGrp="1" noRot="1" noChangeAspect="1" noMove="1" noResize="1" noEditPoints="1" noAdjustHandles="1" noChangeArrowheads="1" noChangeShapeType="1" noTextEdit="1"/>
+          </p:cNvSpPr>
+          <p:nvPr>
+            <p:extLst>
+              <p:ext uri="{386F3935-93C4-4BCD-93E2-E3B085C9AB24}">
+                <p16:designElem xmlns:p16="http://schemas.microsoft.com/office/powerpoint/2015/main" val="1"/>
+              </p:ext>
+            </p:extLst>
+          </p:nvPr>
+        </p:nvSpPr>
+        <p:spPr>
+          <a:xfrm>
+            <a:off x="210312" y="226665"/>
+            <a:ext cx="11722608" cy="6382512"/>
+          </a:xfrm>
+          <a:prstGeom prst="rect">
+            <a:avLst/>
+          </a:prstGeom>
+          <a:ln w="6350" cap="flat" cmpd="sng" algn="ctr">
+            <a:noFill/>
+            <a:prstDash val="solid"/>
+          </a:ln>
+          <a:effectLst>
+            <a:softEdge rad="0"/>
+          </a:effectLst>
+        </p:spPr>
+      </p:sp>
+      <p:sp>
+        <p:nvSpPr>
+          <p:cNvPr id="2" name="Title 1">
+            <a:extLst>
+              <a:ext uri="{FF2B5EF4-FFF2-40B4-BE49-F238E27FC236}">
+                <a16:creationId xmlns:a16="http://schemas.microsoft.com/office/drawing/2014/main" id="{DE12C239-52AD-4D40-9853-DFF483C8EDF3}"/>
+              </a:ext>
+            </a:extLst>
+          </p:cNvPr>
+          <p:cNvSpPr>
+            <a:spLocks noGrp="1"/>
+          </p:cNvSpPr>
+          <p:nvPr>
+            <p:ph type="title"/>
+          </p:nvPr>
+        </p:nvSpPr>
+        <p:spPr>
+          <a:xfrm>
             <a:off x="1175512" y="870132"/>
             <a:ext cx="9792208" cy="1527078"/>
           </a:xfrm>
@@ -18512,7 +18900,7 @@
 </p:sld>
 </file>
 
-<file path=ppt/slides/slide11.xml><?xml version="1.0" encoding="utf-8"?>
+<file path=ppt/slides/slide12.xml><?xml version="1.0" encoding="utf-8"?>
 <p:sld xmlns:a="http://schemas.openxmlformats.org/drawingml/2006/main" xmlns:r="http://schemas.openxmlformats.org/officeDocument/2006/relationships" xmlns:p="http://schemas.openxmlformats.org/presentationml/2006/main">
   <p:cSld>
     <p:bg>
@@ -19115,8 +19503,37 @@
             </a:lvl9pPr>
           </a:lstStyle>
           <a:p>
-            <a:pPr algn="ctr"/>
-            <a:endParaRPr lang="en-US"/>
+            <a:pPr marL="0" marR="0" lvl="0" indent="0" algn="ctr" defTabSz="914400" rtl="0" eaLnBrk="1" fontAlgn="auto" latinLnBrk="0" hangingPunct="1">
+              <a:lnSpc>
+                <a:spcPct val="100000"/>
+              </a:lnSpc>
+              <a:spcBef>
+                <a:spcPts val="0"/>
+              </a:spcBef>
+              <a:spcAft>
+                <a:spcPts val="0"/>
+              </a:spcAft>
+              <a:buClrTx/>
+              <a:buSzTx/>
+              <a:buFontTx/>
+              <a:buNone/>
+              <a:tabLst/>
+              <a:defRPr/>
+            </a:pPr>
+            <a:endParaRPr kumimoji="0" lang="en-US" sz="1800" b="0" i="0" u="none" strike="noStrike" kern="1200" cap="none" spc="0" normalizeH="0" baseline="0" noProof="0">
+              <a:ln>
+                <a:noFill/>
+              </a:ln>
+              <a:solidFill>
+                <a:srgbClr val="FFFFFF"/>
+              </a:solidFill>
+              <a:effectLst/>
+              <a:uLnTx/>
+              <a:uFillTx/>
+              <a:latin typeface="Franklin Gothic Book" panose="02020404030301010803"/>
+              <a:ea typeface="+mn-ea"/>
+              <a:cs typeface="+mn-cs"/>
+            </a:endParaRPr>
           </a:p>
         </p:txBody>
       </p:sp>
@@ -19190,7 +19607,7 @@
           <a:p>
             <a:r>
               <a:rPr lang="en-GB" sz="3200" dirty="0"/>
-              <a:t>Week 1 (Introduction week)</a:t>
+              <a:t>Table of contents</a:t>
             </a:r>
           </a:p>
         </p:txBody>
@@ -19214,34 +19631,115 @@
         <p:spPr>
           <a:xfrm>
             <a:off x="1175512" y="2557849"/>
-            <a:ext cx="9792208" cy="3407862"/>
+            <a:ext cx="9792208" cy="3205388"/>
           </a:xfrm>
         </p:spPr>
         <p:txBody>
           <a:bodyPr>
-            <a:normAutofit/>
+            <a:normAutofit lnSpcReduction="10000"/>
           </a:bodyPr>
           <a:lstStyle/>
           <a:p>
+            <a:r>
+              <a:rPr lang="en-GB" sz="1600" dirty="0">
+                <a:latin typeface="Century Schoolbook (Headings)"/>
+              </a:rPr>
+              <a:t>Week 1 (Introduction week) </a:t>
+            </a:r>
             <a:r>
               <a:rPr lang="en-GB" dirty="0">
                 <a:latin typeface="Century Schoolbook (Headings)"/>
               </a:rPr>
-              <a:t>What is a computer? </a:t>
+              <a:t>Decimal, Binary, Hexadecimal</a:t>
             </a:r>
           </a:p>
           <a:p>
             <a:r>
-              <a:rPr lang="en-GB" dirty="0">
+              <a:rPr lang="en-GB" sz="1600" dirty="0">
                 <a:latin typeface="Century Schoolbook (Headings)"/>
               </a:rPr>
-              <a:t>What does a computer consist of? Parts?</a:t>
+              <a:t>Week 2 (Binary, Hexadecimal, Decimal) Version control system – Git</a:t>
             </a:r>
           </a:p>
           <a:p>
-            <a:pPr marL="0" indent="0">
-              <a:buNone/>
-            </a:pPr>
+            <a:r>
+              <a:rPr lang="en-GB" sz="1600" dirty="0">
+                <a:latin typeface="Century Schoolbook (Headings)"/>
+              </a:rPr>
+              <a:t>Week 3 (signed/unsigned binary, binary addition) Internet Protocol and Network devices</a:t>
+            </a:r>
+          </a:p>
+          <a:p>
+            <a:r>
+              <a:rPr lang="en-GB" sz="1600" dirty="0">
+                <a:latin typeface="Century Schoolbook (Headings)"/>
+              </a:rPr>
+              <a:t>Week 4 (Operating system and virtual machines)</a:t>
+            </a:r>
+          </a:p>
+          <a:p>
+            <a:r>
+              <a:rPr lang="en-GB" sz="1600" dirty="0">
+                <a:latin typeface="Century Schoolbook (Headings)"/>
+              </a:rPr>
+              <a:t>Week 5 (Version control system - Git)</a:t>
+            </a:r>
+          </a:p>
+          <a:p>
+            <a:r>
+              <a:rPr lang="en-GB" sz="1600" dirty="0">
+                <a:latin typeface="Century Schoolbook (Headings)"/>
+              </a:rPr>
+              <a:t>Week 7 (Introduction to Networking – TCP/IP)</a:t>
+            </a:r>
+          </a:p>
+          <a:p>
+            <a:r>
+              <a:rPr lang="en-GB" sz="1600" dirty="0">
+                <a:latin typeface="Century Schoolbook (Headings)"/>
+              </a:rPr>
+              <a:t>Week 8 (Internet Protocol and Network devices)</a:t>
+            </a:r>
+          </a:p>
+          <a:p>
+            <a:r>
+              <a:rPr lang="en-GB" sz="1600" dirty="0">
+                <a:latin typeface="Century Schoolbook (Headings)"/>
+              </a:rPr>
+              <a:t>Week 9 (Routing, Maintenance and drawing of infrastructure)</a:t>
+            </a:r>
+          </a:p>
+          <a:p>
+            <a:r>
+              <a:rPr lang="en-GB" sz="1600" dirty="0">
+                <a:latin typeface="Century Schoolbook (Headings)"/>
+              </a:rPr>
+              <a:t>Week 10 (Transport protocols TCP/UDP)</a:t>
+            </a:r>
+          </a:p>
+          <a:p>
+            <a:endParaRPr lang="en-GB" sz="1600" dirty="0"/>
+          </a:p>
+          <a:p>
+            <a:endParaRPr lang="en-GB" sz="1600" dirty="0"/>
+          </a:p>
+          <a:p>
+            <a:endParaRPr lang="en-GB" sz="1600" dirty="0"/>
+          </a:p>
+          <a:p>
+            <a:endParaRPr lang="en-GB" sz="1600" dirty="0"/>
+          </a:p>
+          <a:p>
+            <a:endParaRPr lang="en-GB" dirty="0">
+              <a:latin typeface="Century Schoolbook (Headings)"/>
+            </a:endParaRPr>
+          </a:p>
+          <a:p>
+            <a:endParaRPr lang="en-GB" dirty="0">
+              <a:latin typeface="Century Schoolbook (Headings)"/>
+            </a:endParaRPr>
+          </a:p>
+          <a:p>
             <a:endParaRPr lang="en-GB" dirty="0">
               <a:latin typeface="Century Schoolbook (Headings)"/>
             </a:endParaRPr>
@@ -19251,7 +19749,7 @@
     </p:spTree>
     <p:extLst>
       <p:ext uri="{BB962C8B-B14F-4D97-AF65-F5344CB8AC3E}">
-        <p14:creationId xmlns:p14="http://schemas.microsoft.com/office/powerpoint/2010/main" val="2236568216"/>
+        <p14:creationId xmlns:p14="http://schemas.microsoft.com/office/powerpoint/2010/main" val="3396382585"/>
       </p:ext>
     </p:extLst>
   </p:cSld>
@@ -19521,7 +20019,7 @@
           <a:p>
             <a:r>
               <a:rPr lang="en-GB" sz="3200" dirty="0"/>
-              <a:t>Week 2 (Binary, Hexadecimal, Decimal)</a:t>
+              <a:t>Week 1 (Introduction week)</a:t>
             </a:r>
           </a:p>
         </p:txBody>
@@ -19558,21 +20056,31 @@
               <a:rPr lang="en-GB" dirty="0">
                 <a:latin typeface="Century Schoolbook (Headings)"/>
               </a:rPr>
-              <a:t>Converting decimal to binary and hexadecimal and reverse</a:t>
+              <a:t>What is a computer? </a:t>
+            </a:r>
+          </a:p>
+          <a:p>
+            <a:r>
+              <a:rPr lang="en-GB" dirty="0">
+                <a:latin typeface="Century Schoolbook (Headings)"/>
+              </a:rPr>
+              <a:t>What does a computer consist of? Parts?</a:t>
             </a:r>
           </a:p>
           <a:p>
             <a:pPr marL="0" indent="0">
               <a:buNone/>
             </a:pPr>
-            <a:endParaRPr lang="en-GB" dirty="0"/>
+            <a:endParaRPr lang="en-GB" dirty="0">
+              <a:latin typeface="Century Schoolbook (Headings)"/>
+            </a:endParaRPr>
           </a:p>
         </p:txBody>
       </p:sp>
     </p:spTree>
     <p:extLst>
       <p:ext uri="{BB962C8B-B14F-4D97-AF65-F5344CB8AC3E}">
-        <p14:creationId xmlns:p14="http://schemas.microsoft.com/office/powerpoint/2010/main" val="3555761046"/>
+        <p14:creationId xmlns:p14="http://schemas.microsoft.com/office/powerpoint/2010/main" val="2236568216"/>
       </p:ext>
     </p:extLst>
   </p:cSld>
@@ -19842,7 +20350,7 @@
           <a:p>
             <a:r>
               <a:rPr lang="en-GB" sz="3200" dirty="0"/>
-              <a:t>Week 3 (signed/unsigned binary, binary addition)</a:t>
+              <a:t>Week 2 (Binary, Hexadecimal, Decimal)</a:t>
             </a:r>
           </a:p>
         </p:txBody>
@@ -19879,63 +20387,21 @@
               <a:rPr lang="en-GB" dirty="0">
                 <a:latin typeface="Century Schoolbook (Headings)"/>
               </a:rPr>
-              <a:t>Bitwise operations</a:t>
+              <a:t>Converting decimal to binary and hexadecimal and reverse</a:t>
             </a:r>
           </a:p>
           <a:p>
-            <a:r>
-              <a:rPr lang="en-GB" dirty="0">
-                <a:latin typeface="Century Schoolbook (Headings)"/>
-              </a:rPr>
-              <a:t>Binary addition</a:t>
-            </a:r>
-          </a:p>
-          <a:p>
-            <a:r>
-              <a:rPr lang="en-GB" dirty="0">
-                <a:latin typeface="Century Schoolbook (Headings)"/>
-              </a:rPr>
-              <a:t>Negative binary numbers</a:t>
-            </a:r>
-          </a:p>
-          <a:p>
-            <a:r>
-              <a:rPr lang="en-GB" dirty="0">
-                <a:latin typeface="Century Schoolbook (Headings)"/>
-              </a:rPr>
-              <a:t>Negation (NOT)</a:t>
-            </a:r>
-          </a:p>
-          <a:p>
-            <a:r>
-              <a:rPr lang="en-GB" dirty="0">
-                <a:latin typeface="Century Schoolbook (Headings)"/>
-              </a:rPr>
-              <a:t>Conjunction (AND)</a:t>
-            </a:r>
-          </a:p>
-          <a:p>
-            <a:r>
-              <a:rPr lang="en-GB" dirty="0">
-                <a:latin typeface="Century Schoolbook (Headings)"/>
-              </a:rPr>
-              <a:t>Disjunction (OR)</a:t>
-            </a:r>
-          </a:p>
-          <a:p>
-            <a:r>
-              <a:rPr lang="en-GB" dirty="0">
-                <a:latin typeface="Century Schoolbook (Headings)"/>
-              </a:rPr>
-              <a:t>Exclusive disjunction (XOR)</a:t>
-            </a:r>
+            <a:pPr marL="0" indent="0">
+              <a:buNone/>
+            </a:pPr>
+            <a:endParaRPr lang="en-GB" dirty="0"/>
           </a:p>
         </p:txBody>
       </p:sp>
     </p:spTree>
     <p:extLst>
       <p:ext uri="{BB962C8B-B14F-4D97-AF65-F5344CB8AC3E}">
-        <p14:creationId xmlns:p14="http://schemas.microsoft.com/office/powerpoint/2010/main" val="1780589342"/>
+        <p14:creationId xmlns:p14="http://schemas.microsoft.com/office/powerpoint/2010/main" val="3555761046"/>
       </p:ext>
     </p:extLst>
   </p:cSld>
@@ -20205,7 +20671,7 @@
           <a:p>
             <a:r>
               <a:rPr lang="en-GB" sz="3200" dirty="0"/>
-              <a:t>Week 4 (Operating system and virtual machines)</a:t>
+              <a:t>Week 3 (signed/unsigned binary, binary addition)</a:t>
             </a:r>
           </a:p>
         </p:txBody>
@@ -20242,7 +20708,7 @@
               <a:rPr lang="en-GB" dirty="0">
                 <a:latin typeface="Century Schoolbook (Headings)"/>
               </a:rPr>
-              <a:t>What is an OS?</a:t>
+              <a:t>Bitwise operations</a:t>
             </a:r>
           </a:p>
           <a:p>
@@ -20250,7 +20716,7 @@
               <a:rPr lang="en-GB" dirty="0">
                 <a:latin typeface="Century Schoolbook (Headings)"/>
               </a:rPr>
-              <a:t>What does an OS do?</a:t>
+              <a:t>Binary addition</a:t>
             </a:r>
           </a:p>
           <a:p>
@@ -20258,7 +20724,7 @@
               <a:rPr lang="en-GB" dirty="0">
                 <a:latin typeface="Century Schoolbook (Headings)"/>
               </a:rPr>
-              <a:t>I/O devices? Examples?</a:t>
+              <a:t>Negative binary numbers</a:t>
             </a:r>
           </a:p>
           <a:p>
@@ -20266,7 +20732,7 @@
               <a:rPr lang="en-GB" dirty="0">
                 <a:latin typeface="Century Schoolbook (Headings)"/>
               </a:rPr>
-              <a:t>What is a virtual machine? </a:t>
+              <a:t>Negation (NOT)</a:t>
             </a:r>
           </a:p>
           <a:p>
@@ -20274,7 +20740,23 @@
               <a:rPr lang="en-GB" dirty="0">
                 <a:latin typeface="Century Schoolbook (Headings)"/>
               </a:rPr>
-              <a:t>What is a node?</a:t>
+              <a:t>Conjunction (AND)</a:t>
+            </a:r>
+          </a:p>
+          <a:p>
+            <a:r>
+              <a:rPr lang="en-GB" dirty="0">
+                <a:latin typeface="Century Schoolbook (Headings)"/>
+              </a:rPr>
+              <a:t>Disjunction (OR)</a:t>
+            </a:r>
+          </a:p>
+          <a:p>
+            <a:r>
+              <a:rPr lang="en-GB" dirty="0">
+                <a:latin typeface="Century Schoolbook (Headings)"/>
+              </a:rPr>
+              <a:t>Exclusive disjunction (XOR)</a:t>
             </a:r>
           </a:p>
         </p:txBody>
@@ -20282,7 +20764,7 @@
     </p:spTree>
     <p:extLst>
       <p:ext uri="{BB962C8B-B14F-4D97-AF65-F5344CB8AC3E}">
-        <p14:creationId xmlns:p14="http://schemas.microsoft.com/office/powerpoint/2010/main" val="3657698924"/>
+        <p14:creationId xmlns:p14="http://schemas.microsoft.com/office/powerpoint/2010/main" val="1780589342"/>
       </p:ext>
     </p:extLst>
   </p:cSld>
@@ -20477,37 +20959,8 @@
             </a:lvl9pPr>
           </a:lstStyle>
           <a:p>
-            <a:pPr marL="0" marR="0" lvl="0" indent="0" algn="ctr" defTabSz="914400" rtl="0" eaLnBrk="1" fontAlgn="auto" latinLnBrk="0" hangingPunct="1">
-              <a:lnSpc>
-                <a:spcPct val="100000"/>
-              </a:lnSpc>
-              <a:spcBef>
-                <a:spcPts val="0"/>
-              </a:spcBef>
-              <a:spcAft>
-                <a:spcPts val="0"/>
-              </a:spcAft>
-              <a:buClrTx/>
-              <a:buSzTx/>
-              <a:buFontTx/>
-              <a:buNone/>
-              <a:tabLst/>
-              <a:defRPr/>
-            </a:pPr>
-            <a:endParaRPr kumimoji="0" lang="en-US" sz="1800" b="0" i="0" u="none" strike="noStrike" kern="1200" cap="none" spc="0" normalizeH="0" baseline="0" noProof="0">
-              <a:ln>
-                <a:noFill/>
-              </a:ln>
-              <a:solidFill>
-                <a:srgbClr val="FFFFFF"/>
-              </a:solidFill>
-              <a:effectLst/>
-              <a:uLnTx/>
-              <a:uFillTx/>
-              <a:latin typeface="Franklin Gothic Book" panose="02020404030301010803"/>
-              <a:ea typeface="+mn-ea"/>
-              <a:cs typeface="+mn-cs"/>
-            </a:endParaRPr>
+            <a:pPr algn="ctr"/>
+            <a:endParaRPr lang="en-US"/>
           </a:p>
         </p:txBody>
       </p:sp>
@@ -20581,7 +21034,7 @@
           <a:p>
             <a:r>
               <a:rPr lang="en-GB" sz="3200" dirty="0"/>
-              <a:t>Week 5 (Version control system - Git)</a:t>
+              <a:t>Week 4 (Operating system and virtual machines)</a:t>
             </a:r>
           </a:p>
         </p:txBody>
@@ -20618,7 +21071,7 @@
               <a:rPr lang="en-GB" dirty="0">
                 <a:latin typeface="Century Schoolbook (Headings)"/>
               </a:rPr>
-              <a:t>What is git?</a:t>
+              <a:t>What is an OS?</a:t>
             </a:r>
           </a:p>
           <a:p>
@@ -20626,7 +21079,7 @@
               <a:rPr lang="en-GB" dirty="0">
                 <a:latin typeface="Century Schoolbook (Headings)"/>
               </a:rPr>
-              <a:t>What is a version control system?</a:t>
+              <a:t>What does an OS do?</a:t>
             </a:r>
           </a:p>
           <a:p>
@@ -20634,23 +21087,31 @@
               <a:rPr lang="en-GB" dirty="0">
                 <a:latin typeface="Century Schoolbook (Headings)"/>
               </a:rPr>
-              <a:t>How does the version control system record changes?</a:t>
+              <a:t>I/O devices? Examples?</a:t>
             </a:r>
           </a:p>
           <a:p>
-            <a:endParaRPr lang="en-GB" dirty="0">
-              <a:latin typeface="Century Schoolbook (Headings)"/>
-            </a:endParaRPr>
-          </a:p>
-          <a:p>
-            <a:endParaRPr lang="en-GB" dirty="0"/>
+            <a:r>
+              <a:rPr lang="en-GB" dirty="0">
+                <a:latin typeface="Century Schoolbook (Headings)"/>
+              </a:rPr>
+              <a:t>What is a virtual machine? </a:t>
+            </a:r>
+          </a:p>
+          <a:p>
+            <a:r>
+              <a:rPr lang="en-GB" dirty="0">
+                <a:latin typeface="Century Schoolbook (Headings)"/>
+              </a:rPr>
+              <a:t>What is a node?</a:t>
+            </a:r>
           </a:p>
         </p:txBody>
       </p:sp>
     </p:spTree>
     <p:extLst>
       <p:ext uri="{BB962C8B-B14F-4D97-AF65-F5344CB8AC3E}">
-        <p14:creationId xmlns:p14="http://schemas.microsoft.com/office/powerpoint/2010/main" val="3943591001"/>
+        <p14:creationId xmlns:p14="http://schemas.microsoft.com/office/powerpoint/2010/main" val="3657698924"/>
       </p:ext>
     </p:extLst>
   </p:cSld>
@@ -20949,7 +21410,7 @@
           <a:p>
             <a:r>
               <a:rPr lang="en-GB" sz="3200" dirty="0"/>
-              <a:t>Week 7 (Introduction to Networking – TCP/IP)</a:t>
+              <a:t>Week 5 (Version control system - Git)</a:t>
             </a:r>
           </a:p>
         </p:txBody>
@@ -20986,7 +21447,7 @@
               <a:rPr lang="en-GB" dirty="0">
                 <a:latin typeface="Century Schoolbook (Headings)"/>
               </a:rPr>
-              <a:t>Creating a git repository</a:t>
+              <a:t>What is git?</a:t>
             </a:r>
           </a:p>
           <a:p>
@@ -20994,52 +21455,21 @@
               <a:rPr lang="en-GB" dirty="0">
                 <a:latin typeface="Century Schoolbook (Headings)"/>
               </a:rPr>
-              <a:t>Installing </a:t>
+              <a:t>What is a version control system?</a:t>
             </a:r>
-            <a:r>
-              <a:rPr lang="en-GB" dirty="0" err="1">
-                <a:latin typeface="Century Schoolbook (Headings)"/>
-              </a:rPr>
-              <a:t>netkit</a:t>
-            </a:r>
+          </a:p>
+          <a:p>
             <a:r>
               <a:rPr lang="en-GB" dirty="0">
                 <a:latin typeface="Century Schoolbook (Headings)"/>
               </a:rPr>
-              <a:t> on </a:t>
+              <a:t>How does the version control system record changes?</a:t>
             </a:r>
-            <a:r>
-              <a:rPr lang="en-GB" dirty="0" err="1">
-                <a:latin typeface="Century Schoolbook (Headings)"/>
-              </a:rPr>
-              <a:t>vmware</a:t>
-            </a:r>
-            <a:r>
-              <a:rPr lang="en-GB" dirty="0">
-                <a:latin typeface="Century Schoolbook (Headings)"/>
-              </a:rPr>
-              <a:t> with ubuntu</a:t>
-            </a:r>
-          </a:p>
-          <a:p>
-            <a:r>
-              <a:rPr lang="en-GB" dirty="0">
-                <a:latin typeface="Century Schoolbook (Headings)"/>
-              </a:rPr>
-              <a:t>Investigation http protocol with </a:t>
-            </a:r>
-            <a:r>
-              <a:rPr lang="en-GB" dirty="0" err="1">
-                <a:latin typeface="Century Schoolbook (Headings)"/>
-              </a:rPr>
-              <a:t>wireshark</a:t>
-            </a:r>
+          </a:p>
+          <a:p>
             <a:endParaRPr lang="en-GB" dirty="0">
               <a:latin typeface="Century Schoolbook (Headings)"/>
             </a:endParaRPr>
-          </a:p>
-          <a:p>
-            <a:endParaRPr lang="en-GB" dirty="0"/>
           </a:p>
           <a:p>
             <a:endParaRPr lang="en-GB" dirty="0"/>
@@ -21049,7 +21479,7 @@
     </p:spTree>
     <p:extLst>
       <p:ext uri="{BB962C8B-B14F-4D97-AF65-F5344CB8AC3E}">
-        <p14:creationId xmlns:p14="http://schemas.microsoft.com/office/powerpoint/2010/main" val="2524168115"/>
+        <p14:creationId xmlns:p14="http://schemas.microsoft.com/office/powerpoint/2010/main" val="3943591001"/>
       </p:ext>
     </p:extLst>
   </p:cSld>
@@ -21348,7 +21778,7 @@
           <a:p>
             <a:r>
               <a:rPr lang="en-GB" sz="3200" dirty="0"/>
-              <a:t>Week 8 (Internet Protocol and Network devices)</a:t>
+              <a:t>Week 7 (Introduction to Networking – TCP/IP)</a:t>
             </a:r>
           </a:p>
         </p:txBody>
@@ -21385,7 +21815,7 @@
               <a:rPr lang="en-GB" dirty="0">
                 <a:latin typeface="Century Schoolbook (Headings)"/>
               </a:rPr>
-              <a:t>What is a computer network?</a:t>
+              <a:t>Creating a git repository</a:t>
             </a:r>
           </a:p>
           <a:p>
@@ -21393,54 +21823,52 @@
               <a:rPr lang="en-GB" dirty="0">
                 <a:latin typeface="Century Schoolbook (Headings)"/>
               </a:rPr>
-              <a:t>Internet protocol</a:t>
-            </a:r>
-          </a:p>
-          <a:p>
-            <a:r>
-              <a:rPr lang="en-GB" dirty="0">
-                <a:latin typeface="Century Schoolbook (Headings)"/>
-              </a:rPr>
-              <a:t>Ip address ranges</a:t>
-            </a:r>
-          </a:p>
-          <a:p>
-            <a:r>
-              <a:rPr lang="en-GB" dirty="0">
-                <a:latin typeface="Century Schoolbook (Headings)"/>
-              </a:rPr>
-              <a:t>Classful/Classless </a:t>
+              <a:t>Installing </a:t>
             </a:r>
             <a:r>
               <a:rPr lang="en-GB" dirty="0" err="1">
                 <a:latin typeface="Century Schoolbook (Headings)"/>
               </a:rPr>
-              <a:t>ip</a:t>
+              <a:t>netkit</a:t>
             </a:r>
             <a:r>
               <a:rPr lang="en-GB" dirty="0">
                 <a:latin typeface="Century Schoolbook (Headings)"/>
               </a:rPr>
-              <a:t> addresses</a:t>
+              <a:t> on </a:t>
             </a:r>
-          </a:p>
-          <a:p>
+            <a:r>
+              <a:rPr lang="en-GB" dirty="0" err="1">
+                <a:latin typeface="Century Schoolbook (Headings)"/>
+              </a:rPr>
+              <a:t>vmware</a:t>
+            </a:r>
+            <a:r>
+              <a:rPr lang="en-GB" dirty="0">
+                <a:latin typeface="Century Schoolbook (Headings)"/>
+              </a:rPr>
+              <a:t> with ubuntu</a:t>
+            </a:r>
+          </a:p>
+          <a:p>
+            <a:r>
+              <a:rPr lang="en-GB" dirty="0">
+                <a:latin typeface="Century Schoolbook (Headings)"/>
+              </a:rPr>
+              <a:t>Investigation http protocol with </a:t>
+            </a:r>
+            <a:r>
+              <a:rPr lang="en-GB" dirty="0" err="1">
+                <a:latin typeface="Century Schoolbook (Headings)"/>
+              </a:rPr>
+              <a:t>wireshark</a:t>
+            </a:r>
             <a:endParaRPr lang="en-GB" dirty="0">
               <a:latin typeface="Century Schoolbook (Headings)"/>
             </a:endParaRPr>
           </a:p>
           <a:p>
-            <a:endParaRPr lang="en-GB" dirty="0">
-              <a:latin typeface="Century Schoolbook (Headings)"/>
-            </a:endParaRPr>
-          </a:p>
-          <a:p>
-            <a:pPr marL="0" indent="0">
-              <a:buNone/>
-            </a:pPr>
-            <a:endParaRPr lang="en-GB" dirty="0">
-              <a:latin typeface="Century Schoolbook (Headings)"/>
-            </a:endParaRPr>
+            <a:endParaRPr lang="en-GB" dirty="0"/>
           </a:p>
           <a:p>
             <a:endParaRPr lang="en-GB" dirty="0"/>
@@ -21450,7 +21878,7 @@
     </p:spTree>
     <p:extLst>
       <p:ext uri="{BB962C8B-B14F-4D97-AF65-F5344CB8AC3E}">
-        <p14:creationId xmlns:p14="http://schemas.microsoft.com/office/powerpoint/2010/main" val="823944180"/>
+        <p14:creationId xmlns:p14="http://schemas.microsoft.com/office/powerpoint/2010/main" val="2524168115"/>
       </p:ext>
     </p:extLst>
   </p:cSld>
@@ -21737,8 +22165,8 @@
         </p:nvSpPr>
         <p:spPr>
           <a:xfrm>
-            <a:off x="1173480" y="870132"/>
-            <a:ext cx="9794240" cy="1527078"/>
+            <a:off x="1175512" y="870132"/>
+            <a:ext cx="9792208" cy="1527078"/>
           </a:xfrm>
         </p:spPr>
         <p:txBody>
@@ -21749,7 +22177,7 @@
           <a:p>
             <a:r>
               <a:rPr lang="en-GB" sz="3200" dirty="0"/>
-              <a:t>Week 9 (Routing, Maintenance and drawing of infrastructure)</a:t>
+              <a:t>Week 8 (Internet Protocol and Network devices)</a:t>
             </a:r>
           </a:p>
         </p:txBody>
@@ -21786,7 +22214,7 @@
               <a:rPr lang="en-GB" dirty="0">
                 <a:latin typeface="Century Schoolbook (Headings)"/>
               </a:rPr>
-              <a:t>Direct host route</a:t>
+              <a:t>What is a computer network?</a:t>
             </a:r>
           </a:p>
           <a:p>
@@ -21794,7 +22222,7 @@
               <a:rPr lang="en-GB" dirty="0">
                 <a:latin typeface="Century Schoolbook (Headings)"/>
               </a:rPr>
-              <a:t>Default route</a:t>
+              <a:t>Internet protocol</a:t>
             </a:r>
           </a:p>
           <a:p>
@@ -21802,7 +22230,7 @@
               <a:rPr lang="en-GB" dirty="0">
                 <a:latin typeface="Century Schoolbook (Headings)"/>
               </a:rPr>
-              <a:t>Host route</a:t>
+              <a:t>Ip address ranges</a:t>
             </a:r>
           </a:p>
           <a:p>
@@ -21810,19 +22238,38 @@
               <a:rPr lang="en-GB" dirty="0">
                 <a:latin typeface="Century Schoolbook (Headings)"/>
               </a:rPr>
-              <a:t>Network route</a:t>
+              <a:t>Classful/Classless </a:t>
             </a:r>
-          </a:p>
-          <a:p>
+            <a:r>
+              <a:rPr lang="en-GB" dirty="0" err="1">
+                <a:latin typeface="Century Schoolbook (Headings)"/>
+              </a:rPr>
+              <a:t>ip</a:t>
+            </a:r>
             <a:r>
               <a:rPr lang="en-GB" dirty="0">
                 <a:latin typeface="Century Schoolbook (Headings)"/>
               </a:rPr>
-              <a:t>How did we apply the above methods?</a:t>
+              <a:t> addresses</a:t>
             </a:r>
           </a:p>
           <a:p>
-            <a:endParaRPr lang="en-GB" dirty="0"/>
+            <a:endParaRPr lang="en-GB" dirty="0">
+              <a:latin typeface="Century Schoolbook (Headings)"/>
+            </a:endParaRPr>
+          </a:p>
+          <a:p>
+            <a:endParaRPr lang="en-GB" dirty="0">
+              <a:latin typeface="Century Schoolbook (Headings)"/>
+            </a:endParaRPr>
+          </a:p>
+          <a:p>
+            <a:pPr marL="0" indent="0">
+              <a:buNone/>
+            </a:pPr>
+            <a:endParaRPr lang="en-GB" dirty="0">
+              <a:latin typeface="Century Schoolbook (Headings)"/>
+            </a:endParaRPr>
           </a:p>
           <a:p>
             <a:endParaRPr lang="en-GB" dirty="0"/>
@@ -21832,7 +22279,7 @@
     </p:spTree>
     <p:extLst>
       <p:ext uri="{BB962C8B-B14F-4D97-AF65-F5344CB8AC3E}">
-        <p14:creationId xmlns:p14="http://schemas.microsoft.com/office/powerpoint/2010/main" val="276864233"/>
+        <p14:creationId xmlns:p14="http://schemas.microsoft.com/office/powerpoint/2010/main" val="823944180"/>
       </p:ext>
     </p:extLst>
   </p:cSld>

</xml_diff>